<commit_message>
Added item for order sets
</commit_message>
<xml_diff>
--- a/input/images-source/CatalogBindings.pptx
+++ b/input/images-source/CatalogBindings.pptx
@@ -107,6 +107,11 @@
       </a:defRPr>
     </a:lvl9pPr>
   </p:defaultTextStyle>
+  <p:extLst>
+    <p:ext uri="{EFAFB233-063F-42B5-8137-9DF3F51BA10A}">
+      <p15:sldGuideLst xmlns:p15="http://schemas.microsoft.com/office/powerpoint/2012/main"/>
+    </p:ext>
+  </p:extLst>
 </p:presentation>
 </file>
 
@@ -192,7 +197,7 @@
           <a:p>
             <a:fld id="{C0FC2EA5-DDD9-41B5-A743-573E81829967}" type="datetimeFigureOut">
               <a:rPr lang="fr-FR" smtClean="0"/>
-              <a:t>10/01/2020</a:t>
+              <a:t>28/07/2020</a:t>
             </a:fld>
             <a:endParaRPr lang="fr-FR"/>
           </a:p>
@@ -690,7 +695,7 @@
           <a:p>
             <a:fld id="{DEBA1CB3-45B4-4365-8A01-D60AF6EBF46C}" type="datetimeFigureOut">
               <a:rPr lang="fr-FR" smtClean="0"/>
-              <a:t>10/01/2020</a:t>
+              <a:t>28/07/2020</a:t>
             </a:fld>
             <a:endParaRPr lang="fr-FR"/>
           </a:p>
@@ -888,7 +893,7 @@
           <a:p>
             <a:fld id="{DEBA1CB3-45B4-4365-8A01-D60AF6EBF46C}" type="datetimeFigureOut">
               <a:rPr lang="fr-FR" smtClean="0"/>
-              <a:t>10/01/2020</a:t>
+              <a:t>28/07/2020</a:t>
             </a:fld>
             <a:endParaRPr lang="fr-FR"/>
           </a:p>
@@ -1096,7 +1101,7 @@
           <a:p>
             <a:fld id="{DEBA1CB3-45B4-4365-8A01-D60AF6EBF46C}" type="datetimeFigureOut">
               <a:rPr lang="fr-FR" smtClean="0"/>
-              <a:t>10/01/2020</a:t>
+              <a:t>28/07/2020</a:t>
             </a:fld>
             <a:endParaRPr lang="fr-FR"/>
           </a:p>
@@ -1294,7 +1299,7 @@
           <a:p>
             <a:fld id="{DEBA1CB3-45B4-4365-8A01-D60AF6EBF46C}" type="datetimeFigureOut">
               <a:rPr lang="fr-FR" smtClean="0"/>
-              <a:t>10/01/2020</a:t>
+              <a:t>28/07/2020</a:t>
             </a:fld>
             <a:endParaRPr lang="fr-FR"/>
           </a:p>
@@ -1569,7 +1574,7 @@
           <a:p>
             <a:fld id="{DEBA1CB3-45B4-4365-8A01-D60AF6EBF46C}" type="datetimeFigureOut">
               <a:rPr lang="fr-FR" smtClean="0"/>
-              <a:t>10/01/2020</a:t>
+              <a:t>28/07/2020</a:t>
             </a:fld>
             <a:endParaRPr lang="fr-FR"/>
           </a:p>
@@ -1834,7 +1839,7 @@
           <a:p>
             <a:fld id="{DEBA1CB3-45B4-4365-8A01-D60AF6EBF46C}" type="datetimeFigureOut">
               <a:rPr lang="fr-FR" smtClean="0"/>
-              <a:t>10/01/2020</a:t>
+              <a:t>28/07/2020</a:t>
             </a:fld>
             <a:endParaRPr lang="fr-FR"/>
           </a:p>
@@ -2246,7 +2251,7 @@
           <a:p>
             <a:fld id="{DEBA1CB3-45B4-4365-8A01-D60AF6EBF46C}" type="datetimeFigureOut">
               <a:rPr lang="fr-FR" smtClean="0"/>
-              <a:t>10/01/2020</a:t>
+              <a:t>28/07/2020</a:t>
             </a:fld>
             <a:endParaRPr lang="fr-FR"/>
           </a:p>
@@ -2387,7 +2392,7 @@
           <a:p>
             <a:fld id="{DEBA1CB3-45B4-4365-8A01-D60AF6EBF46C}" type="datetimeFigureOut">
               <a:rPr lang="fr-FR" smtClean="0"/>
-              <a:t>10/01/2020</a:t>
+              <a:t>28/07/2020</a:t>
             </a:fld>
             <a:endParaRPr lang="fr-FR"/>
           </a:p>
@@ -2500,7 +2505,7 @@
           <a:p>
             <a:fld id="{DEBA1CB3-45B4-4365-8A01-D60AF6EBF46C}" type="datetimeFigureOut">
               <a:rPr lang="fr-FR" smtClean="0"/>
-              <a:t>10/01/2020</a:t>
+              <a:t>28/07/2020</a:t>
             </a:fld>
             <a:endParaRPr lang="fr-FR"/>
           </a:p>
@@ -2811,7 +2816,7 @@
           <a:p>
             <a:fld id="{DEBA1CB3-45B4-4365-8A01-D60AF6EBF46C}" type="datetimeFigureOut">
               <a:rPr lang="fr-FR" smtClean="0"/>
-              <a:t>10/01/2020</a:t>
+              <a:t>28/07/2020</a:t>
             </a:fld>
             <a:endParaRPr lang="fr-FR"/>
           </a:p>
@@ -3099,7 +3104,7 @@
           <a:p>
             <a:fld id="{DEBA1CB3-45B4-4365-8A01-D60AF6EBF46C}" type="datetimeFigureOut">
               <a:rPr lang="fr-FR" smtClean="0"/>
-              <a:t>10/01/2020</a:t>
+              <a:t>28/07/2020</a:t>
             </a:fld>
             <a:endParaRPr lang="fr-FR"/>
           </a:p>
@@ -3340,7 +3345,7 @@
           <a:p>
             <a:fld id="{DEBA1CB3-45B4-4365-8A01-D60AF6EBF46C}" type="datetimeFigureOut">
               <a:rPr lang="fr-FR" smtClean="0"/>
-              <a:t>10/01/2020</a:t>
+              <a:t>28/07/2020</a:t>
             </a:fld>
             <a:endParaRPr lang="fr-FR"/>
           </a:p>
@@ -4114,7 +4119,7 @@
         <p:spPr>
           <a:xfrm>
             <a:off x="3917745" y="5324116"/>
-            <a:ext cx="5093111" cy="1323439"/>
+            <a:ext cx="5093111" cy="1631216"/>
           </a:xfrm>
           <a:prstGeom prst="rect">
             <a:avLst/>
@@ -4175,6 +4180,23 @@
                 </a:solidFill>
               </a:rPr>
               <a:t>drug formulary: MedicationKnowledge,</a:t>
+            </a:r>
+          </a:p>
+          <a:p>
+            <a:pPr marL="285750" indent="-285750">
+              <a:buFont typeface="Arial" panose="020B0604020202020204" pitchFamily="34" charset="0"/>
+              <a:buChar char="•"/>
+            </a:pPr>
+            <a:r>
+              <a:rPr lang="en-US" sz="2000" noProof="1">
+                <a:solidFill>
+                  <a:schemeClr val="tx1">
+                    <a:lumMod val="65000"/>
+                    <a:lumOff val="35000"/>
+                  </a:schemeClr>
+                </a:solidFill>
+              </a:rPr>
+              <a:t>Order sets: PlanDefinition</a:t>
             </a:r>
           </a:p>
           <a:p>

</xml_diff>

<commit_message>
Application of the first 22 dispositions of September ballot
Figures, blood electrolye example, and most html pages.
</commit_message>
<xml_diff>
--- a/input/images-source/CatalogBindings.pptx
+++ b/input/images-source/CatalogBindings.pptx
@@ -197,7 +197,7 @@
           <a:p>
             <a:fld id="{C0FC2EA5-DDD9-41B5-A743-573E81829967}" type="datetimeFigureOut">
               <a:rPr lang="fr-FR" smtClean="0"/>
-              <a:t>28/07/2020</a:t>
+              <a:t>18/11/2020</a:t>
             </a:fld>
             <a:endParaRPr lang="fr-FR"/>
           </a:p>
@@ -695,7 +695,7 @@
           <a:p>
             <a:fld id="{DEBA1CB3-45B4-4365-8A01-D60AF6EBF46C}" type="datetimeFigureOut">
               <a:rPr lang="fr-FR" smtClean="0"/>
-              <a:t>28/07/2020</a:t>
+              <a:t>18/11/2020</a:t>
             </a:fld>
             <a:endParaRPr lang="fr-FR"/>
           </a:p>
@@ -893,7 +893,7 @@
           <a:p>
             <a:fld id="{DEBA1CB3-45B4-4365-8A01-D60AF6EBF46C}" type="datetimeFigureOut">
               <a:rPr lang="fr-FR" smtClean="0"/>
-              <a:t>28/07/2020</a:t>
+              <a:t>18/11/2020</a:t>
             </a:fld>
             <a:endParaRPr lang="fr-FR"/>
           </a:p>
@@ -1101,7 +1101,7 @@
           <a:p>
             <a:fld id="{DEBA1CB3-45B4-4365-8A01-D60AF6EBF46C}" type="datetimeFigureOut">
               <a:rPr lang="fr-FR" smtClean="0"/>
-              <a:t>28/07/2020</a:t>
+              <a:t>18/11/2020</a:t>
             </a:fld>
             <a:endParaRPr lang="fr-FR"/>
           </a:p>
@@ -1299,7 +1299,7 @@
           <a:p>
             <a:fld id="{DEBA1CB3-45B4-4365-8A01-D60AF6EBF46C}" type="datetimeFigureOut">
               <a:rPr lang="fr-FR" smtClean="0"/>
-              <a:t>28/07/2020</a:t>
+              <a:t>18/11/2020</a:t>
             </a:fld>
             <a:endParaRPr lang="fr-FR"/>
           </a:p>
@@ -1574,7 +1574,7 @@
           <a:p>
             <a:fld id="{DEBA1CB3-45B4-4365-8A01-D60AF6EBF46C}" type="datetimeFigureOut">
               <a:rPr lang="fr-FR" smtClean="0"/>
-              <a:t>28/07/2020</a:t>
+              <a:t>18/11/2020</a:t>
             </a:fld>
             <a:endParaRPr lang="fr-FR"/>
           </a:p>
@@ -1839,7 +1839,7 @@
           <a:p>
             <a:fld id="{DEBA1CB3-45B4-4365-8A01-D60AF6EBF46C}" type="datetimeFigureOut">
               <a:rPr lang="fr-FR" smtClean="0"/>
-              <a:t>28/07/2020</a:t>
+              <a:t>18/11/2020</a:t>
             </a:fld>
             <a:endParaRPr lang="fr-FR"/>
           </a:p>
@@ -2251,7 +2251,7 @@
           <a:p>
             <a:fld id="{DEBA1CB3-45B4-4365-8A01-D60AF6EBF46C}" type="datetimeFigureOut">
               <a:rPr lang="fr-FR" smtClean="0"/>
-              <a:t>28/07/2020</a:t>
+              <a:t>18/11/2020</a:t>
             </a:fld>
             <a:endParaRPr lang="fr-FR"/>
           </a:p>
@@ -2392,7 +2392,7 @@
           <a:p>
             <a:fld id="{DEBA1CB3-45B4-4365-8A01-D60AF6EBF46C}" type="datetimeFigureOut">
               <a:rPr lang="fr-FR" smtClean="0"/>
-              <a:t>28/07/2020</a:t>
+              <a:t>18/11/2020</a:t>
             </a:fld>
             <a:endParaRPr lang="fr-FR"/>
           </a:p>
@@ -2505,7 +2505,7 @@
           <a:p>
             <a:fld id="{DEBA1CB3-45B4-4365-8A01-D60AF6EBF46C}" type="datetimeFigureOut">
               <a:rPr lang="fr-FR" smtClean="0"/>
-              <a:t>28/07/2020</a:t>
+              <a:t>18/11/2020</a:t>
             </a:fld>
             <a:endParaRPr lang="fr-FR"/>
           </a:p>
@@ -2816,7 +2816,7 @@
           <a:p>
             <a:fld id="{DEBA1CB3-45B4-4365-8A01-D60AF6EBF46C}" type="datetimeFigureOut">
               <a:rPr lang="fr-FR" smtClean="0"/>
-              <a:t>28/07/2020</a:t>
+              <a:t>18/11/2020</a:t>
             </a:fld>
             <a:endParaRPr lang="fr-FR"/>
           </a:p>
@@ -3104,7 +3104,7 @@
           <a:p>
             <a:fld id="{DEBA1CB3-45B4-4365-8A01-D60AF6EBF46C}" type="datetimeFigureOut">
               <a:rPr lang="fr-FR" smtClean="0"/>
-              <a:t>28/07/2020</a:t>
+              <a:t>18/11/2020</a:t>
             </a:fld>
             <a:endParaRPr lang="fr-FR"/>
           </a:p>
@@ -3345,7 +3345,7 @@
           <a:p>
             <a:fld id="{DEBA1CB3-45B4-4365-8A01-D60AF6EBF46C}" type="datetimeFigureOut">
               <a:rPr lang="fr-FR" smtClean="0"/>
-              <a:t>28/07/2020</a:t>
+              <a:t>18/11/2020</a:t>
             </a:fld>
             <a:endParaRPr lang="fr-FR"/>
           </a:p>
@@ -3776,42 +3776,23 @@
         </p:nvSpPr>
         <p:spPr>
           <a:xfrm>
-            <a:off x="223932" y="195935"/>
+            <a:off x="1925145" y="185302"/>
             <a:ext cx="2642684" cy="830161"/>
           </a:xfrm>
           <a:prstGeom prst="rect">
             <a:avLst/>
           </a:prstGeom>
-          <a:gradFill flip="none" rotWithShape="1">
-            <a:gsLst>
-              <a:gs pos="0">
-                <a:schemeClr val="accent1">
-                  <a:shade val="30000"/>
-                  <a:satMod val="115000"/>
-                </a:schemeClr>
-              </a:gs>
-              <a:gs pos="50000">
-                <a:schemeClr val="accent1">
-                  <a:shade val="67500"/>
-                  <a:satMod val="115000"/>
-                </a:schemeClr>
-              </a:gs>
-              <a:gs pos="100000">
-                <a:schemeClr val="accent1">
-                  <a:shade val="100000"/>
-                  <a:satMod val="115000"/>
-                </a:schemeClr>
-              </a:gs>
-            </a:gsLst>
-            <a:lin ang="0" scaled="1"/>
-            <a:tileRect/>
-          </a:gradFill>
+          <a:solidFill>
+            <a:schemeClr val="accent4">
+              <a:lumMod val="50000"/>
+            </a:schemeClr>
+          </a:solidFill>
           <a:ln>
             <a:noFill/>
           </a:ln>
           <a:effectLst>
-            <a:glow rad="139700">
-              <a:schemeClr val="accent1">
+            <a:glow rad="63500">
+              <a:schemeClr val="accent2">
                 <a:satMod val="175000"/>
                 <a:alpha val="40000"/>
               </a:schemeClr>
@@ -3838,7 +3819,7 @@
           <a:bodyPr rtlCol="0" anchor="ctr"/>
           <a:lstStyle/>
           <a:p>
-            <a:pPr algn="ctr"/>
+            <a:pPr algn="ctr" defTabSz="457200"/>
             <a:r>
               <a:rPr lang="en-US" sz="2400" noProof="1">
                 <a:solidFill>
@@ -3848,14 +3829,22 @@
               <a:t>Catalog</a:t>
             </a:r>
             <a:r>
-              <a:rPr lang="en-US" sz="2400" noProof="1"/>
+              <a:rPr lang="en-US" sz="1013" noProof="1">
+                <a:solidFill>
+                  <a:srgbClr val="FFFF00"/>
+                </a:solidFill>
+              </a:rPr>
               <a:t> </a:t>
             </a:r>
           </a:p>
           <a:p>
-            <a:pPr algn="ctr"/>
-            <a:r>
-              <a:rPr lang="en-US" sz="2000" noProof="1"/>
+            <a:pPr algn="ctr" defTabSz="457200"/>
+            <a:r>
+              <a:rPr lang="en-US" sz="2000" noProof="1">
+                <a:solidFill>
+                  <a:schemeClr val="bg1"/>
+                </a:solidFill>
+              </a:rPr>
               <a:t>profile of </a:t>
             </a:r>
             <a:r>
@@ -3866,11 +3855,6 @@
               </a:rPr>
               <a:t>Composition</a:t>
             </a:r>
-            <a:endParaRPr lang="en-US" sz="2400" noProof="1">
-              <a:solidFill>
-                <a:srgbClr val="FFFF00"/>
-              </a:solidFill>
-            </a:endParaRPr>
           </a:p>
         </p:txBody>
       </p:sp>
@@ -3888,7 +3872,7 @@
         </p:nvSpPr>
         <p:spPr>
           <a:xfrm>
-            <a:off x="223931" y="3823446"/>
+            <a:off x="1265925" y="3749015"/>
             <a:ext cx="2855358" cy="1442889"/>
           </a:xfrm>
           <a:prstGeom prst="cloud">
@@ -3953,8 +3937,8 @@
         </p:nvSpPr>
         <p:spPr>
           <a:xfrm>
-            <a:off x="591729" y="5322118"/>
-            <a:ext cx="2275452" cy="707886"/>
+            <a:off x="1633723" y="5247687"/>
+            <a:ext cx="2275452" cy="1631216"/>
           </a:xfrm>
           <a:prstGeom prst="rect">
             <a:avLst/>
@@ -3967,6 +3951,10 @@
           </a:bodyPr>
           <a:lstStyle/>
           <a:p>
+            <a:pPr marL="342900" indent="-342900">
+              <a:buFont typeface="Arial" panose="020B0604020202020204" pitchFamily="34" charset="0"/>
+              <a:buChar char="•"/>
+            </a:pPr>
             <a:r>
               <a:rPr lang="en-US" sz="2000" noProof="1">
                 <a:solidFill>
@@ -3976,7 +3964,75 @@
                   </a:schemeClr>
                 </a:solidFill>
               </a:rPr>
-              <a:t>category, custodian, title, date …</a:t>
+              <a:t>category, </a:t>
+            </a:r>
+          </a:p>
+          <a:p>
+            <a:pPr marL="342900" indent="-342900">
+              <a:buFont typeface="Arial" panose="020B0604020202020204" pitchFamily="34" charset="0"/>
+              <a:buChar char="•"/>
+            </a:pPr>
+            <a:r>
+              <a:rPr lang="en-US" sz="2000" noProof="1">
+                <a:solidFill>
+                  <a:schemeClr val="tx1">
+                    <a:lumMod val="65000"/>
+                    <a:lumOff val="35000"/>
+                  </a:schemeClr>
+                </a:solidFill>
+              </a:rPr>
+              <a:t>custodian, </a:t>
+            </a:r>
+          </a:p>
+          <a:p>
+            <a:pPr marL="342900" indent="-342900">
+              <a:buFont typeface="Arial" panose="020B0604020202020204" pitchFamily="34" charset="0"/>
+              <a:buChar char="•"/>
+            </a:pPr>
+            <a:r>
+              <a:rPr lang="en-US" sz="2000" noProof="1">
+                <a:solidFill>
+                  <a:schemeClr val="tx1">
+                    <a:lumMod val="65000"/>
+                    <a:lumOff val="35000"/>
+                  </a:schemeClr>
+                </a:solidFill>
+              </a:rPr>
+              <a:t>title, </a:t>
+            </a:r>
+          </a:p>
+          <a:p>
+            <a:pPr marL="342900" indent="-342900">
+              <a:buFont typeface="Arial" panose="020B0604020202020204" pitchFamily="34" charset="0"/>
+              <a:buChar char="•"/>
+            </a:pPr>
+            <a:r>
+              <a:rPr lang="en-US" sz="2000" noProof="1">
+                <a:solidFill>
+                  <a:schemeClr val="tx1">
+                    <a:lumMod val="65000"/>
+                    <a:lumOff val="35000"/>
+                  </a:schemeClr>
+                </a:solidFill>
+              </a:rPr>
+              <a:t>date </a:t>
+            </a:r>
+          </a:p>
+          <a:p>
+            <a:pPr marL="342900" indent="-342900">
+              <a:buFont typeface="Arial" panose="020B0604020202020204" pitchFamily="34" charset="0"/>
+              <a:buChar char="•"/>
+            </a:pPr>
+            <a:r>
+              <a:rPr lang="en-US" sz="2000" noProof="1">
+                <a:solidFill>
+                  <a:schemeClr val="tx1">
+                    <a:lumMod val="65000"/>
+                    <a:lumOff val="35000"/>
+                  </a:schemeClr>
+                </a:solidFill>
+              </a:rPr>
+              <a:t>…</a:t>
             </a:r>
           </a:p>
         </p:txBody>
@@ -3995,7 +4051,7 @@
         </p:nvSpPr>
         <p:spPr>
           <a:xfrm>
-            <a:off x="2982829" y="2463434"/>
+            <a:off x="4637660" y="2738802"/>
             <a:ext cx="607145" cy="400110"/>
           </a:xfrm>
           <a:prstGeom prst="rect">
@@ -4030,7 +4086,7 @@
         </p:nvSpPr>
         <p:spPr>
           <a:xfrm>
-            <a:off x="5495728" y="1175431"/>
+            <a:off x="5495728" y="1101000"/>
             <a:ext cx="2092574" cy="1140542"/>
           </a:xfrm>
           <a:prstGeom prst="rect">
@@ -4064,7 +4120,7 @@
             <a:noFill/>
           </a:ln>
           <a:effectLst>
-            <a:glow rad="139700">
+            <a:glow rad="63500">
               <a:schemeClr val="accent1">
                 <a:satMod val="175000"/>
                 <a:alpha val="40000"/>
@@ -4118,7 +4174,7 @@
         </p:nvSpPr>
         <p:spPr>
           <a:xfrm>
-            <a:off x="3917745" y="5324116"/>
+            <a:off x="4254631" y="5249685"/>
             <a:ext cx="5093111" cy="1631216"/>
           </a:xfrm>
           <a:prstGeom prst="rect">
@@ -4232,7 +4288,7 @@
         </p:nvSpPr>
         <p:spPr>
           <a:xfrm>
-            <a:off x="4226764" y="3429000"/>
+            <a:off x="4563650" y="3354569"/>
             <a:ext cx="4124130" cy="1902639"/>
           </a:xfrm>
           <a:prstGeom prst="cloud">
@@ -4297,8 +4353,8 @@
         </p:nvSpPr>
         <p:spPr>
           <a:xfrm>
-            <a:off x="9106283" y="5322118"/>
-            <a:ext cx="2962410" cy="1323439"/>
+            <a:off x="9106283" y="4891071"/>
+            <a:ext cx="2962410" cy="1938992"/>
           </a:xfrm>
           <a:prstGeom prst="rect">
             <a:avLst/>
@@ -4311,6 +4367,10 @@
           </a:bodyPr>
           <a:lstStyle/>
           <a:p>
+            <a:pPr marL="182563" indent="-182563">
+              <a:buFont typeface="Arial" panose="020B0604020202020204" pitchFamily="34" charset="0"/>
+              <a:buChar char="•"/>
+            </a:pPr>
             <a:r>
               <a:rPr lang="en-US" sz="2000" noProof="1">
                 <a:solidFill>
@@ -4320,10 +4380,31 @@
                   </a:schemeClr>
                 </a:solidFill>
               </a:rPr>
-              <a:t>ActivityDefinition, ObservationDefinition,</a:t>
-            </a:r>
-          </a:p>
-          <a:p>
+              <a:t>ActivityDefinition,</a:t>
+            </a:r>
+          </a:p>
+          <a:p>
+            <a:pPr marL="182563" indent="-182563">
+              <a:buFont typeface="Arial" panose="020B0604020202020204" pitchFamily="34" charset="0"/>
+              <a:buChar char="•"/>
+            </a:pPr>
+            <a:r>
+              <a:rPr lang="en-US" sz="2000" noProof="1">
+                <a:solidFill>
+                  <a:schemeClr val="tx1">
+                    <a:lumMod val="65000"/>
+                    <a:lumOff val="35000"/>
+                  </a:schemeClr>
+                </a:solidFill>
+              </a:rPr>
+              <a:t> ObservationDefinition,</a:t>
+            </a:r>
+          </a:p>
+          <a:p>
+            <a:pPr marL="182563" indent="-182563">
+              <a:buFont typeface="Arial" panose="020B0604020202020204" pitchFamily="34" charset="0"/>
+              <a:buChar char="•"/>
+            </a:pPr>
             <a:r>
               <a:rPr lang="en-US" sz="2000" noProof="1">
                 <a:solidFill>
@@ -4337,6 +4418,10 @@
             </a:r>
           </a:p>
           <a:p>
+            <a:pPr marL="182563" indent="-182563">
+              <a:buFont typeface="Arial" panose="020B0604020202020204" pitchFamily="34" charset="0"/>
+              <a:buChar char="•"/>
+            </a:pPr>
             <a:r>
               <a:rPr lang="en-US" sz="2000" noProof="1">
                 <a:solidFill>
@@ -4346,7 +4431,41 @@
                   </a:schemeClr>
                 </a:solidFill>
               </a:rPr>
-              <a:t>ConceptMap, …</a:t>
+              <a:t>ConceptMap, </a:t>
+            </a:r>
+          </a:p>
+          <a:p>
+            <a:pPr marL="182563" indent="-182563">
+              <a:buFont typeface="Arial" panose="020B0604020202020204" pitchFamily="34" charset="0"/>
+              <a:buChar char="•"/>
+            </a:pPr>
+            <a:r>
+              <a:rPr lang="en-US" sz="2000" noProof="1">
+                <a:solidFill>
+                  <a:schemeClr val="tx1">
+                    <a:lumMod val="65000"/>
+                    <a:lumOff val="35000"/>
+                  </a:schemeClr>
+                </a:solidFill>
+              </a:rPr>
+              <a:t>ChargeItemDefinition </a:t>
+            </a:r>
+          </a:p>
+          <a:p>
+            <a:pPr marL="182563" indent="-182563">
+              <a:buFont typeface="Arial" panose="020B0604020202020204" pitchFamily="34" charset="0"/>
+              <a:buChar char="•"/>
+            </a:pPr>
+            <a:r>
+              <a:rPr lang="en-US" sz="2000" noProof="1">
+                <a:solidFill>
+                  <a:schemeClr val="tx1">
+                    <a:lumMod val="65000"/>
+                    <a:lumOff val="35000"/>
+                  </a:schemeClr>
+                </a:solidFill>
+              </a:rPr>
+              <a:t>…</a:t>
             </a:r>
           </a:p>
         </p:txBody>
@@ -4365,7 +4484,7 @@
         </p:nvSpPr>
         <p:spPr>
           <a:xfrm>
-            <a:off x="9505930" y="1174278"/>
+            <a:off x="9505930" y="1099847"/>
             <a:ext cx="2231977" cy="1140542"/>
           </a:xfrm>
           <a:prstGeom prst="rect">
@@ -4399,7 +4518,7 @@
             <a:noFill/>
           </a:ln>
           <a:effectLst>
-            <a:glow rad="139700">
+            <a:glow rad="63500">
               <a:schemeClr val="accent1">
                 <a:satMod val="175000"/>
                 <a:alpha val="40000"/>
@@ -4453,7 +4572,7 @@
         </p:nvSpPr>
         <p:spPr>
           <a:xfrm>
-            <a:off x="8853034" y="1358107"/>
+            <a:off x="8853034" y="1283676"/>
             <a:ext cx="631723" cy="400110"/>
           </a:xfrm>
           <a:prstGeom prst="rect">
@@ -4492,7 +4611,7 @@
         </p:nvCxnSpPr>
         <p:spPr>
           <a:xfrm flipV="1">
-            <a:off x="7588302" y="1744549"/>
+            <a:off x="7588302" y="1670118"/>
             <a:ext cx="1917628" cy="1153"/>
           </a:xfrm>
           <a:prstGeom prst="straightConnector1">
@@ -4532,7 +4651,7 @@
         </p:nvSpPr>
         <p:spPr>
           <a:xfrm>
-            <a:off x="9010856" y="3521104"/>
+            <a:off x="9010856" y="3144921"/>
             <a:ext cx="3057837" cy="1778734"/>
           </a:xfrm>
           <a:prstGeom prst="cloud">
@@ -4601,8 +4720,8 @@
         </p:nvCxnSpPr>
         <p:spPr>
           <a:xfrm rot="5400000">
-            <a:off x="4442709" y="745665"/>
-            <a:ext cx="528999" cy="3669614"/>
+            <a:off x="5303949" y="1511208"/>
+            <a:ext cx="507733" cy="1968401"/>
           </a:xfrm>
           <a:prstGeom prst="bentConnector2">
             <a:avLst/>
@@ -4641,7 +4760,7 @@
         </p:nvSpPr>
         <p:spPr>
           <a:xfrm>
-            <a:off x="6608349" y="611015"/>
+            <a:off x="6608349" y="536584"/>
             <a:ext cx="607145" cy="400110"/>
           </a:xfrm>
           <a:prstGeom prst="rect">
@@ -4664,93 +4783,35 @@
       </p:sp>
       <p:sp>
         <p:nvSpPr>
-          <p:cNvPr id="39" name="ZoneTexte 38">
-            <a:extLst>
-              <a:ext uri="{FF2B5EF4-FFF2-40B4-BE49-F238E27FC236}">
-                <a16:creationId xmlns:a16="http://schemas.microsoft.com/office/drawing/2014/main" id="{A2DFDAB1-39F2-40ED-A765-CC48D12DE95E}"/>
-              </a:ext>
-            </a:extLst>
-          </p:cNvPr>
-          <p:cNvSpPr txBox="1"/>
+          <p:cNvPr id="20" name="Rectangle 19">
+            <a:extLst>
+              <a:ext uri="{FF2B5EF4-FFF2-40B4-BE49-F238E27FC236}">
+                <a16:creationId xmlns:a16="http://schemas.microsoft.com/office/drawing/2014/main" id="{0EF34064-8B6F-4B06-B950-EFD89EB71C6D}"/>
+              </a:ext>
+            </a:extLst>
+          </p:cNvPr>
+          <p:cNvSpPr/>
           <p:nvPr/>
         </p:nvSpPr>
         <p:spPr>
           <a:xfrm>
-            <a:off x="3833468" y="210905"/>
-            <a:ext cx="1278654" cy="400110"/>
-          </a:xfrm>
-          <a:prstGeom prst="rect">
-            <a:avLst/>
-          </a:prstGeom>
-          <a:noFill/>
-        </p:spPr>
-        <p:txBody>
-          <a:bodyPr wrap="square" rtlCol="0">
-            <a:spAutoFit/>
-          </a:bodyPr>
-          <a:lstStyle/>
-          <a:p>
-            <a:r>
-              <a:rPr lang="en-US" sz="2000" dirty="0">
-                <a:solidFill>
-                  <a:srgbClr val="0070C0"/>
-                </a:solidFill>
-              </a:rPr>
-              <a:t>Method 1</a:t>
-            </a:r>
-          </a:p>
-        </p:txBody>
-      </p:sp>
-      <p:sp>
-        <p:nvSpPr>
-          <p:cNvPr id="20" name="Rectangle 19">
-            <a:extLst>
-              <a:ext uri="{FF2B5EF4-FFF2-40B4-BE49-F238E27FC236}">
-                <a16:creationId xmlns:a16="http://schemas.microsoft.com/office/drawing/2014/main" id="{0EF34064-8B6F-4B06-B950-EFD89EB71C6D}"/>
-              </a:ext>
-            </a:extLst>
-          </p:cNvPr>
-          <p:cNvSpPr/>
-          <p:nvPr/>
-        </p:nvSpPr>
-        <p:spPr>
-          <a:xfrm>
-            <a:off x="223931" y="2371959"/>
+            <a:off x="1925144" y="2276262"/>
             <a:ext cx="2648470" cy="946025"/>
           </a:xfrm>
           <a:prstGeom prst="rect">
             <a:avLst/>
           </a:prstGeom>
-          <a:gradFill flip="none" rotWithShape="1">
-            <a:gsLst>
-              <a:gs pos="0">
-                <a:schemeClr val="accent1">
-                  <a:shade val="30000"/>
-                  <a:satMod val="115000"/>
-                </a:schemeClr>
-              </a:gs>
-              <a:gs pos="50000">
-                <a:schemeClr val="accent1">
-                  <a:shade val="67500"/>
-                  <a:satMod val="115000"/>
-                </a:schemeClr>
-              </a:gs>
-              <a:gs pos="100000">
-                <a:schemeClr val="accent1">
-                  <a:shade val="100000"/>
-                  <a:satMod val="115000"/>
-                </a:schemeClr>
-              </a:gs>
-            </a:gsLst>
-            <a:lin ang="0" scaled="1"/>
-            <a:tileRect/>
-          </a:gradFill>
+          <a:solidFill>
+            <a:schemeClr val="accent6">
+              <a:lumMod val="75000"/>
+            </a:schemeClr>
+          </a:solidFill>
           <a:ln>
             <a:noFill/>
           </a:ln>
           <a:effectLst>
-            <a:glow rad="139700">
-              <a:schemeClr val="accent1">
+            <a:glow rad="63500">
+              <a:schemeClr val="accent6">
                 <a:satMod val="175000"/>
                 <a:alpha val="40000"/>
               </a:schemeClr>
@@ -4777,7 +4838,7 @@
           <a:bodyPr rtlCol="0" anchor="ctr"/>
           <a:lstStyle/>
           <a:p>
-            <a:pPr algn="ctr"/>
+            <a:pPr algn="ctr" defTabSz="457200"/>
             <a:r>
               <a:rPr lang="en-US" sz="2400" noProof="1">
                 <a:solidFill>
@@ -4787,7 +4848,11 @@
               <a:t>CatalogHeader </a:t>
             </a:r>
             <a:r>
-              <a:rPr lang="en-US" sz="2000" noProof="1"/>
+              <a:rPr lang="en-US" sz="2000" noProof="1">
+                <a:solidFill>
+                  <a:schemeClr val="bg1"/>
+                </a:solidFill>
+              </a:rPr>
               <a:t>profile of </a:t>
             </a:r>
             <a:r>
@@ -4798,6 +4863,11 @@
               </a:rPr>
               <a:t>Composition</a:t>
             </a:r>
+            <a:endParaRPr lang="en-US" sz="2400" noProof="1">
+              <a:solidFill>
+                <a:srgbClr val="FFFF00"/>
+              </a:solidFill>
+            </a:endParaRPr>
           </a:p>
         </p:txBody>
       </p:sp>
@@ -4819,8 +4889,8 @@
         </p:nvCxnSpPr>
         <p:spPr>
           <a:xfrm>
-            <a:off x="2866616" y="611016"/>
-            <a:ext cx="3675399" cy="564415"/>
+            <a:off x="4567829" y="600383"/>
+            <a:ext cx="1974186" cy="500617"/>
           </a:xfrm>
           <a:prstGeom prst="bentConnector2">
             <a:avLst/>
@@ -4859,8 +4929,91 @@
         </p:nvSpPr>
         <p:spPr>
           <a:xfrm>
-            <a:off x="3833468" y="2405521"/>
-            <a:ext cx="1278654" cy="400110"/>
+            <a:off x="5357757" y="2334873"/>
+            <a:ext cx="3117297" cy="307777"/>
+          </a:xfrm>
+          <a:prstGeom prst="rect">
+            <a:avLst/>
+          </a:prstGeom>
+          <a:solidFill>
+            <a:schemeClr val="bg1"/>
+          </a:solidFill>
+        </p:spPr>
+        <p:txBody>
+          <a:bodyPr wrap="square" lIns="0" tIns="0" rIns="0" bIns="0" rtlCol="0">
+            <a:spAutoFit/>
+          </a:bodyPr>
+          <a:lstStyle/>
+          <a:p>
+            <a:r>
+              <a:rPr lang="en-US" sz="2000" noProof="1">
+                <a:solidFill>
+                  <a:srgbClr val="0070C0"/>
+                </a:solidFill>
+              </a:rPr>
+              <a:t>extension:catalogReference</a:t>
+            </a:r>
+          </a:p>
+        </p:txBody>
+      </p:sp>
+      <p:sp>
+        <p:nvSpPr>
+          <p:cNvPr id="39" name="ZoneTexte 38">
+            <a:extLst>
+              <a:ext uri="{FF2B5EF4-FFF2-40B4-BE49-F238E27FC236}">
+                <a16:creationId xmlns:a16="http://schemas.microsoft.com/office/drawing/2014/main" id="{A2DFDAB1-39F2-40ED-A765-CC48D12DE95E}"/>
+              </a:ext>
+            </a:extLst>
+          </p:cNvPr>
+          <p:cNvSpPr txBox="1"/>
+          <p:nvPr/>
+        </p:nvSpPr>
+        <p:spPr>
+          <a:xfrm>
+            <a:off x="4786473" y="422713"/>
+            <a:ext cx="1439570" cy="307777"/>
+          </a:xfrm>
+          <a:prstGeom prst="rect">
+            <a:avLst/>
+          </a:prstGeom>
+          <a:solidFill>
+            <a:schemeClr val="bg1"/>
+          </a:solidFill>
+        </p:spPr>
+        <p:txBody>
+          <a:bodyPr wrap="square" lIns="0" tIns="0" rIns="0" bIns="0" rtlCol="0">
+            <a:spAutoFit/>
+          </a:bodyPr>
+          <a:lstStyle/>
+          <a:p>
+            <a:pPr algn="ctr"/>
+            <a:r>
+              <a:rPr lang="en-US" sz="2000" noProof="1">
+                <a:solidFill>
+                  <a:srgbClr val="0070C0"/>
+                </a:solidFill>
+              </a:rPr>
+              <a:t>section.entry</a:t>
+            </a:r>
+          </a:p>
+        </p:txBody>
+      </p:sp>
+      <p:sp>
+        <p:nvSpPr>
+          <p:cNvPr id="2" name="ZoneTexte 1">
+            <a:extLst>
+              <a:ext uri="{FF2B5EF4-FFF2-40B4-BE49-F238E27FC236}">
+                <a16:creationId xmlns:a16="http://schemas.microsoft.com/office/drawing/2014/main" id="{09925C88-5DDB-4CCF-A9FE-7F7B50870664}"/>
+              </a:ext>
+            </a:extLst>
+          </p:cNvPr>
+          <p:cNvSpPr txBox="1"/>
+          <p:nvPr/>
+        </p:nvSpPr>
+        <p:spPr>
+          <a:xfrm>
+            <a:off x="113851" y="92550"/>
+            <a:ext cx="1688690" cy="1015663"/>
           </a:xfrm>
           <a:prstGeom prst="rect">
             <a:avLst/>
@@ -4873,13 +5026,46 @@
           </a:bodyPr>
           <a:lstStyle/>
           <a:p>
-            <a:r>
-              <a:rPr lang="en-US" sz="2000" dirty="0">
-                <a:solidFill>
-                  <a:srgbClr val="0070C0"/>
-                </a:solidFill>
-              </a:rPr>
-              <a:t>Method 2</a:t>
+            <a:pPr algn="r"/>
+            <a:r>
+              <a:rPr lang="en-US" sz="2000" i="1" noProof="1"/>
+              <a:t>a catalog handled with method 1</a:t>
+            </a:r>
+          </a:p>
+        </p:txBody>
+      </p:sp>
+      <p:sp>
+        <p:nvSpPr>
+          <p:cNvPr id="3" name="ZoneTexte 2">
+            <a:extLst>
+              <a:ext uri="{FF2B5EF4-FFF2-40B4-BE49-F238E27FC236}">
+                <a16:creationId xmlns:a16="http://schemas.microsoft.com/office/drawing/2014/main" id="{4CE0BDDA-6B60-46E0-97FB-017DF6251B3D}"/>
+              </a:ext>
+            </a:extLst>
+          </p:cNvPr>
+          <p:cNvSpPr txBox="1"/>
+          <p:nvPr/>
+        </p:nvSpPr>
+        <p:spPr>
+          <a:xfrm>
+            <a:off x="113851" y="2241442"/>
+            <a:ext cx="1688690" cy="1015663"/>
+          </a:xfrm>
+          <a:prstGeom prst="rect">
+            <a:avLst/>
+          </a:prstGeom>
+          <a:noFill/>
+        </p:spPr>
+        <p:txBody>
+          <a:bodyPr wrap="square" rtlCol="0">
+            <a:spAutoFit/>
+          </a:bodyPr>
+          <a:lstStyle/>
+          <a:p>
+            <a:pPr algn="r"/>
+            <a:r>
+              <a:rPr lang="en-US" sz="2000" i="1" noProof="1"/>
+              <a:t>a catalog handled with method 2</a:t>
             </a:r>
           </a:p>
         </p:txBody>

</xml_diff>

<commit_message>
Clarification of diagrams of catalogs
</commit_message>
<xml_diff>
--- a/input/images-source/CatalogBindings.pptx
+++ b/input/images-source/CatalogBindings.pptx
@@ -197,7 +197,7 @@
           <a:p>
             <a:fld id="{C0FC2EA5-DDD9-41B5-A743-573E81829967}" type="datetimeFigureOut">
               <a:rPr lang="fr-FR" smtClean="0"/>
-              <a:t>18/11/2020</a:t>
+              <a:t>19/08/2021</a:t>
             </a:fld>
             <a:endParaRPr lang="fr-FR"/>
           </a:p>
@@ -695,7 +695,7 @@
           <a:p>
             <a:fld id="{DEBA1CB3-45B4-4365-8A01-D60AF6EBF46C}" type="datetimeFigureOut">
               <a:rPr lang="fr-FR" smtClean="0"/>
-              <a:t>18/11/2020</a:t>
+              <a:t>19/08/2021</a:t>
             </a:fld>
             <a:endParaRPr lang="fr-FR"/>
           </a:p>
@@ -893,7 +893,7 @@
           <a:p>
             <a:fld id="{DEBA1CB3-45B4-4365-8A01-D60AF6EBF46C}" type="datetimeFigureOut">
               <a:rPr lang="fr-FR" smtClean="0"/>
-              <a:t>18/11/2020</a:t>
+              <a:t>19/08/2021</a:t>
             </a:fld>
             <a:endParaRPr lang="fr-FR"/>
           </a:p>
@@ -1101,7 +1101,7 @@
           <a:p>
             <a:fld id="{DEBA1CB3-45B4-4365-8A01-D60AF6EBF46C}" type="datetimeFigureOut">
               <a:rPr lang="fr-FR" smtClean="0"/>
-              <a:t>18/11/2020</a:t>
+              <a:t>19/08/2021</a:t>
             </a:fld>
             <a:endParaRPr lang="fr-FR"/>
           </a:p>
@@ -1299,7 +1299,7 @@
           <a:p>
             <a:fld id="{DEBA1CB3-45B4-4365-8A01-D60AF6EBF46C}" type="datetimeFigureOut">
               <a:rPr lang="fr-FR" smtClean="0"/>
-              <a:t>18/11/2020</a:t>
+              <a:t>19/08/2021</a:t>
             </a:fld>
             <a:endParaRPr lang="fr-FR"/>
           </a:p>
@@ -1574,7 +1574,7 @@
           <a:p>
             <a:fld id="{DEBA1CB3-45B4-4365-8A01-D60AF6EBF46C}" type="datetimeFigureOut">
               <a:rPr lang="fr-FR" smtClean="0"/>
-              <a:t>18/11/2020</a:t>
+              <a:t>19/08/2021</a:t>
             </a:fld>
             <a:endParaRPr lang="fr-FR"/>
           </a:p>
@@ -1839,7 +1839,7 @@
           <a:p>
             <a:fld id="{DEBA1CB3-45B4-4365-8A01-D60AF6EBF46C}" type="datetimeFigureOut">
               <a:rPr lang="fr-FR" smtClean="0"/>
-              <a:t>18/11/2020</a:t>
+              <a:t>19/08/2021</a:t>
             </a:fld>
             <a:endParaRPr lang="fr-FR"/>
           </a:p>
@@ -2251,7 +2251,7 @@
           <a:p>
             <a:fld id="{DEBA1CB3-45B4-4365-8A01-D60AF6EBF46C}" type="datetimeFigureOut">
               <a:rPr lang="fr-FR" smtClean="0"/>
-              <a:t>18/11/2020</a:t>
+              <a:t>19/08/2021</a:t>
             </a:fld>
             <a:endParaRPr lang="fr-FR"/>
           </a:p>
@@ -2392,7 +2392,7 @@
           <a:p>
             <a:fld id="{DEBA1CB3-45B4-4365-8A01-D60AF6EBF46C}" type="datetimeFigureOut">
               <a:rPr lang="fr-FR" smtClean="0"/>
-              <a:t>18/11/2020</a:t>
+              <a:t>19/08/2021</a:t>
             </a:fld>
             <a:endParaRPr lang="fr-FR"/>
           </a:p>
@@ -2505,7 +2505,7 @@
           <a:p>
             <a:fld id="{DEBA1CB3-45B4-4365-8A01-D60AF6EBF46C}" type="datetimeFigureOut">
               <a:rPr lang="fr-FR" smtClean="0"/>
-              <a:t>18/11/2020</a:t>
+              <a:t>19/08/2021</a:t>
             </a:fld>
             <a:endParaRPr lang="fr-FR"/>
           </a:p>
@@ -2816,7 +2816,7 @@
           <a:p>
             <a:fld id="{DEBA1CB3-45B4-4365-8A01-D60AF6EBF46C}" type="datetimeFigureOut">
               <a:rPr lang="fr-FR" smtClean="0"/>
-              <a:t>18/11/2020</a:t>
+              <a:t>19/08/2021</a:t>
             </a:fld>
             <a:endParaRPr lang="fr-FR"/>
           </a:p>
@@ -3104,7 +3104,7 @@
           <a:p>
             <a:fld id="{DEBA1CB3-45B4-4365-8A01-D60AF6EBF46C}" type="datetimeFigureOut">
               <a:rPr lang="fr-FR" smtClean="0"/>
-              <a:t>18/11/2020</a:t>
+              <a:t>19/08/2021</a:t>
             </a:fld>
             <a:endParaRPr lang="fr-FR"/>
           </a:p>
@@ -3345,7 +3345,7 @@
           <a:p>
             <a:fld id="{DEBA1CB3-45B4-4365-8A01-D60AF6EBF46C}" type="datetimeFigureOut">
               <a:rPr lang="fr-FR" smtClean="0"/>
-              <a:t>18/11/2020</a:t>
+              <a:t>19/08/2021</a:t>
             </a:fld>
             <a:endParaRPr lang="fr-FR"/>
           </a:p>
@@ -3790,14 +3790,7 @@
           <a:ln>
             <a:noFill/>
           </a:ln>
-          <a:effectLst>
-            <a:glow rad="63500">
-              <a:schemeClr val="accent2">
-                <a:satMod val="175000"/>
-                <a:alpha val="40000"/>
-              </a:schemeClr>
-            </a:glow>
-          </a:effectLst>
+          <a:effectLst/>
         </p:spPr>
         <p:style>
           <a:lnRef idx="2">
@@ -4119,14 +4112,7 @@
           <a:ln>
             <a:noFill/>
           </a:ln>
-          <a:effectLst>
-            <a:glow rad="63500">
-              <a:schemeClr val="accent1">
-                <a:satMod val="175000"/>
-                <a:alpha val="40000"/>
-              </a:schemeClr>
-            </a:glow>
-          </a:effectLst>
+          <a:effectLst/>
         </p:spPr>
         <p:style>
           <a:lnRef idx="2">
@@ -4517,14 +4503,7 @@
           <a:ln>
             <a:noFill/>
           </a:ln>
-          <a:effectLst>
-            <a:glow rad="63500">
-              <a:schemeClr val="accent1">
-                <a:satMod val="175000"/>
-                <a:alpha val="40000"/>
-              </a:schemeClr>
-            </a:glow>
-          </a:effectLst>
+          <a:effectLst/>
         </p:spPr>
         <p:style>
           <a:lnRef idx="2">
@@ -4809,14 +4788,7 @@
           <a:ln>
             <a:noFill/>
           </a:ln>
-          <a:effectLst>
-            <a:glow rad="63500">
-              <a:schemeClr val="accent6">
-                <a:satMod val="175000"/>
-                <a:alpha val="40000"/>
-              </a:schemeClr>
-            </a:glow>
-          </a:effectLst>
+          <a:effectLst/>
         </p:spPr>
         <p:style>
           <a:lnRef idx="2">

</xml_diff>

<commit_message>
Reopen Composition.subject for grafting DaVinci
</commit_message>
<xml_diff>
--- a/input/images-source/CatalogBindings.pptx
+++ b/input/images-source/CatalogBindings.pptx
@@ -197,7 +197,7 @@
           <a:p>
             <a:fld id="{C0FC2EA5-DDD9-41B5-A743-573E81829967}" type="datetimeFigureOut">
               <a:rPr lang="fr-FR" smtClean="0"/>
-              <a:t>19/08/2021</a:t>
+              <a:t>20/08/2021</a:t>
             </a:fld>
             <a:endParaRPr lang="fr-FR"/>
           </a:p>
@@ -695,7 +695,7 @@
           <a:p>
             <a:fld id="{DEBA1CB3-45B4-4365-8A01-D60AF6EBF46C}" type="datetimeFigureOut">
               <a:rPr lang="fr-FR" smtClean="0"/>
-              <a:t>19/08/2021</a:t>
+              <a:t>20/08/2021</a:t>
             </a:fld>
             <a:endParaRPr lang="fr-FR"/>
           </a:p>
@@ -893,7 +893,7 @@
           <a:p>
             <a:fld id="{DEBA1CB3-45B4-4365-8A01-D60AF6EBF46C}" type="datetimeFigureOut">
               <a:rPr lang="fr-FR" smtClean="0"/>
-              <a:t>19/08/2021</a:t>
+              <a:t>20/08/2021</a:t>
             </a:fld>
             <a:endParaRPr lang="fr-FR"/>
           </a:p>
@@ -1101,7 +1101,7 @@
           <a:p>
             <a:fld id="{DEBA1CB3-45B4-4365-8A01-D60AF6EBF46C}" type="datetimeFigureOut">
               <a:rPr lang="fr-FR" smtClean="0"/>
-              <a:t>19/08/2021</a:t>
+              <a:t>20/08/2021</a:t>
             </a:fld>
             <a:endParaRPr lang="fr-FR"/>
           </a:p>
@@ -1299,7 +1299,7 @@
           <a:p>
             <a:fld id="{DEBA1CB3-45B4-4365-8A01-D60AF6EBF46C}" type="datetimeFigureOut">
               <a:rPr lang="fr-FR" smtClean="0"/>
-              <a:t>19/08/2021</a:t>
+              <a:t>20/08/2021</a:t>
             </a:fld>
             <a:endParaRPr lang="fr-FR"/>
           </a:p>
@@ -1574,7 +1574,7 @@
           <a:p>
             <a:fld id="{DEBA1CB3-45B4-4365-8A01-D60AF6EBF46C}" type="datetimeFigureOut">
               <a:rPr lang="fr-FR" smtClean="0"/>
-              <a:t>19/08/2021</a:t>
+              <a:t>20/08/2021</a:t>
             </a:fld>
             <a:endParaRPr lang="fr-FR"/>
           </a:p>
@@ -1839,7 +1839,7 @@
           <a:p>
             <a:fld id="{DEBA1CB3-45B4-4365-8A01-D60AF6EBF46C}" type="datetimeFigureOut">
               <a:rPr lang="fr-FR" smtClean="0"/>
-              <a:t>19/08/2021</a:t>
+              <a:t>20/08/2021</a:t>
             </a:fld>
             <a:endParaRPr lang="fr-FR"/>
           </a:p>
@@ -2251,7 +2251,7 @@
           <a:p>
             <a:fld id="{DEBA1CB3-45B4-4365-8A01-D60AF6EBF46C}" type="datetimeFigureOut">
               <a:rPr lang="fr-FR" smtClean="0"/>
-              <a:t>19/08/2021</a:t>
+              <a:t>20/08/2021</a:t>
             </a:fld>
             <a:endParaRPr lang="fr-FR"/>
           </a:p>
@@ -2392,7 +2392,7 @@
           <a:p>
             <a:fld id="{DEBA1CB3-45B4-4365-8A01-D60AF6EBF46C}" type="datetimeFigureOut">
               <a:rPr lang="fr-FR" smtClean="0"/>
-              <a:t>19/08/2021</a:t>
+              <a:t>20/08/2021</a:t>
             </a:fld>
             <a:endParaRPr lang="fr-FR"/>
           </a:p>
@@ -2505,7 +2505,7 @@
           <a:p>
             <a:fld id="{DEBA1CB3-45B4-4365-8A01-D60AF6EBF46C}" type="datetimeFigureOut">
               <a:rPr lang="fr-FR" smtClean="0"/>
-              <a:t>19/08/2021</a:t>
+              <a:t>20/08/2021</a:t>
             </a:fld>
             <a:endParaRPr lang="fr-FR"/>
           </a:p>
@@ -2816,7 +2816,7 @@
           <a:p>
             <a:fld id="{DEBA1CB3-45B4-4365-8A01-D60AF6EBF46C}" type="datetimeFigureOut">
               <a:rPr lang="fr-FR" smtClean="0"/>
-              <a:t>19/08/2021</a:t>
+              <a:t>20/08/2021</a:t>
             </a:fld>
             <a:endParaRPr lang="fr-FR"/>
           </a:p>
@@ -3104,7 +3104,7 @@
           <a:p>
             <a:fld id="{DEBA1CB3-45B4-4365-8A01-D60AF6EBF46C}" type="datetimeFigureOut">
               <a:rPr lang="fr-FR" smtClean="0"/>
-              <a:t>19/08/2021</a:t>
+              <a:t>20/08/2021</a:t>
             </a:fld>
             <a:endParaRPr lang="fr-FR"/>
           </a:p>
@@ -3345,7 +3345,7 @@
           <a:p>
             <a:fld id="{DEBA1CB3-45B4-4365-8A01-D60AF6EBF46C}" type="datetimeFigureOut">
               <a:rPr lang="fr-FR" smtClean="0"/>
-              <a:t>19/08/2021</a:t>
+              <a:t>20/08/2021</a:t>
             </a:fld>
             <a:endParaRPr lang="fr-FR"/>
           </a:p>
@@ -3776,8 +3776,8 @@
         </p:nvSpPr>
         <p:spPr>
           <a:xfrm>
-            <a:off x="1925145" y="185302"/>
-            <a:ext cx="2642684" cy="830161"/>
+            <a:off x="1929089" y="21178"/>
+            <a:ext cx="2638740" cy="899898"/>
           </a:xfrm>
           <a:prstGeom prst="rect">
             <a:avLst/>
@@ -4044,7 +4044,7 @@
         </p:nvSpPr>
         <p:spPr>
           <a:xfrm>
-            <a:off x="4637660" y="2738802"/>
+            <a:off x="4637660" y="3045567"/>
             <a:ext cx="607145" cy="400110"/>
           </a:xfrm>
           <a:prstGeom prst="rect">
@@ -4699,8 +4699,8 @@
         </p:nvCxnSpPr>
         <p:spPr>
           <a:xfrm rot="5400000">
-            <a:off x="5303949" y="1511208"/>
-            <a:ext cx="507733" cy="1968401"/>
+            <a:off x="5150566" y="1664591"/>
+            <a:ext cx="814498" cy="1968401"/>
           </a:xfrm>
           <a:prstGeom prst="bentConnector2">
             <a:avLst/>
@@ -4739,7 +4739,7 @@
         </p:nvSpPr>
         <p:spPr>
           <a:xfrm>
-            <a:off x="6608349" y="536584"/>
+            <a:off x="6590111" y="709986"/>
             <a:ext cx="607145" cy="400110"/>
           </a:xfrm>
           <a:prstGeom prst="rect">
@@ -4774,7 +4774,7 @@
         </p:nvSpPr>
         <p:spPr>
           <a:xfrm>
-            <a:off x="1925144" y="2276262"/>
+            <a:off x="1925144" y="2583027"/>
             <a:ext cx="2648470" cy="946025"/>
           </a:xfrm>
           <a:prstGeom prst="rect">
@@ -4861,8 +4861,8 @@
         </p:nvCxnSpPr>
         <p:spPr>
           <a:xfrm>
-            <a:off x="4567829" y="600383"/>
-            <a:ext cx="1974186" cy="500617"/>
+            <a:off x="4567829" y="471127"/>
+            <a:ext cx="1974186" cy="629873"/>
           </a:xfrm>
           <a:prstGeom prst="bentConnector2">
             <a:avLst/>
@@ -4942,7 +4942,7 @@
         </p:nvSpPr>
         <p:spPr>
           <a:xfrm>
-            <a:off x="4786473" y="422713"/>
+            <a:off x="4786473" y="328325"/>
             <a:ext cx="1439570" cy="307777"/>
           </a:xfrm>
           <a:prstGeom prst="rect">
@@ -4984,7 +4984,7 @@
         </p:nvSpPr>
         <p:spPr>
           <a:xfrm>
-            <a:off x="113851" y="92550"/>
+            <a:off x="113851" y="-1838"/>
             <a:ext cx="1688690" cy="1015663"/>
           </a:xfrm>
           <a:prstGeom prst="rect">
@@ -5020,7 +5020,7 @@
         </p:nvSpPr>
         <p:spPr>
           <a:xfrm>
-            <a:off x="113851" y="2241442"/>
+            <a:off x="113851" y="2548207"/>
             <a:ext cx="1688690" cy="1015663"/>
           </a:xfrm>
           <a:prstGeom prst="rect">
@@ -5038,6 +5038,289 @@
             <a:r>
               <a:rPr lang="en-US" sz="2000" i="1" noProof="1"/>
               <a:t>a catalog handled with method 2</a:t>
+            </a:r>
+          </a:p>
+        </p:txBody>
+      </p:sp>
+      <p:sp>
+        <p:nvSpPr>
+          <p:cNvPr id="22" name="Rectangle 21">
+            <a:extLst>
+              <a:ext uri="{FF2B5EF4-FFF2-40B4-BE49-F238E27FC236}">
+                <a16:creationId xmlns:a16="http://schemas.microsoft.com/office/drawing/2014/main" id="{AD95C44B-8436-47FD-8890-471655C0F355}"/>
+              </a:ext>
+            </a:extLst>
+          </p:cNvPr>
+          <p:cNvSpPr/>
+          <p:nvPr/>
+        </p:nvSpPr>
+        <p:spPr>
+          <a:xfrm>
+            <a:off x="2630369" y="1271066"/>
+            <a:ext cx="1239608" cy="899898"/>
+          </a:xfrm>
+          <a:prstGeom prst="rect">
+            <a:avLst/>
+          </a:prstGeom>
+          <a:solidFill>
+            <a:schemeClr val="bg1"/>
+          </a:solidFill>
+          <a:ln>
+            <a:solidFill>
+              <a:schemeClr val="accent1"/>
+            </a:solidFill>
+          </a:ln>
+          <a:effectLst/>
+        </p:spPr>
+        <p:style>
+          <a:lnRef idx="2">
+            <a:schemeClr val="accent1">
+              <a:shade val="50000"/>
+            </a:schemeClr>
+          </a:lnRef>
+          <a:fillRef idx="1">
+            <a:schemeClr val="accent1"/>
+          </a:fillRef>
+          <a:effectRef idx="0">
+            <a:schemeClr val="accent1"/>
+          </a:effectRef>
+          <a:fontRef idx="minor">
+            <a:schemeClr val="lt1"/>
+          </a:fontRef>
+        </p:style>
+        <p:txBody>
+          <a:bodyPr rtlCol="0" anchor="ctr"/>
+          <a:lstStyle/>
+          <a:p>
+            <a:pPr algn="ctr"/>
+            <a:r>
+              <a:rPr lang="en-US" sz="2400" noProof="1">
+                <a:solidFill>
+                  <a:srgbClr val="0070C0"/>
+                </a:solidFill>
+              </a:rPr>
+              <a:t>Any</a:t>
+            </a:r>
+          </a:p>
+        </p:txBody>
+      </p:sp>
+      <p:cxnSp>
+        <p:nvCxnSpPr>
+          <p:cNvPr id="23" name="Connecteur : en angle 22">
+            <a:extLst>
+              <a:ext uri="{FF2B5EF4-FFF2-40B4-BE49-F238E27FC236}">
+                <a16:creationId xmlns:a16="http://schemas.microsoft.com/office/drawing/2014/main" id="{25EB9E85-479B-4D6B-B6C3-2653F9F2A543}"/>
+              </a:ext>
+            </a:extLst>
+          </p:cNvPr>
+          <p:cNvCxnSpPr>
+            <a:cxnSpLocks/>
+            <a:stCxn id="22" idx="2"/>
+            <a:endCxn id="20" idx="0"/>
+          </p:cNvCxnSpPr>
+          <p:nvPr/>
+        </p:nvCxnSpPr>
+        <p:spPr>
+          <a:xfrm rot="5400000">
+            <a:off x="3043745" y="2376598"/>
+            <a:ext cx="412063" cy="794"/>
+          </a:xfrm>
+          <a:prstGeom prst="bentConnector3">
+            <a:avLst>
+              <a:gd name="adj1" fmla="val 50000"/>
+            </a:avLst>
+          </a:prstGeom>
+          <a:ln w="28575">
+            <a:headEnd type="arrow" w="med" len="med"/>
+            <a:tailEnd type="none" w="med" len="med"/>
+          </a:ln>
+        </p:spPr>
+        <p:style>
+          <a:lnRef idx="1">
+            <a:schemeClr val="accent1"/>
+          </a:lnRef>
+          <a:fillRef idx="0">
+            <a:schemeClr val="accent1"/>
+          </a:fillRef>
+          <a:effectRef idx="0">
+            <a:schemeClr val="accent1"/>
+          </a:effectRef>
+          <a:fontRef idx="minor">
+            <a:schemeClr val="tx1"/>
+          </a:fontRef>
+        </p:style>
+      </p:cxnSp>
+      <p:cxnSp>
+        <p:nvCxnSpPr>
+          <p:cNvPr id="27" name="Connecteur : en angle 26">
+            <a:extLst>
+              <a:ext uri="{FF2B5EF4-FFF2-40B4-BE49-F238E27FC236}">
+                <a16:creationId xmlns:a16="http://schemas.microsoft.com/office/drawing/2014/main" id="{DB50664D-5408-4475-976C-839D52058549}"/>
+              </a:ext>
+            </a:extLst>
+          </p:cNvPr>
+          <p:cNvCxnSpPr>
+            <a:cxnSpLocks/>
+            <a:stCxn id="22" idx="0"/>
+            <a:endCxn id="5" idx="2"/>
+          </p:cNvCxnSpPr>
+          <p:nvPr/>
+        </p:nvCxnSpPr>
+        <p:spPr>
+          <a:xfrm rot="16200000" flipV="1">
+            <a:off x="3074321" y="1095214"/>
+            <a:ext cx="349990" cy="1714"/>
+          </a:xfrm>
+          <a:prstGeom prst="bentConnector3">
+            <a:avLst>
+              <a:gd name="adj1" fmla="val 50000"/>
+            </a:avLst>
+          </a:prstGeom>
+          <a:ln w="28575">
+            <a:headEnd type="arrow" w="med" len="med"/>
+            <a:tailEnd type="none" w="med" len="med"/>
+          </a:ln>
+        </p:spPr>
+        <p:style>
+          <a:lnRef idx="1">
+            <a:schemeClr val="accent1"/>
+          </a:lnRef>
+          <a:fillRef idx="0">
+            <a:schemeClr val="accent1"/>
+          </a:fillRef>
+          <a:effectRef idx="0">
+            <a:schemeClr val="accent1"/>
+          </a:effectRef>
+          <a:fontRef idx="minor">
+            <a:schemeClr val="tx1"/>
+          </a:fontRef>
+        </p:style>
+      </p:cxnSp>
+      <p:sp>
+        <p:nvSpPr>
+          <p:cNvPr id="33" name="ZoneTexte 32">
+            <a:extLst>
+              <a:ext uri="{FF2B5EF4-FFF2-40B4-BE49-F238E27FC236}">
+                <a16:creationId xmlns:a16="http://schemas.microsoft.com/office/drawing/2014/main" id="{FDE2CA6B-826F-4AAB-A44C-6C5D0A18A69E}"/>
+              </a:ext>
+            </a:extLst>
+          </p:cNvPr>
+          <p:cNvSpPr txBox="1"/>
+          <p:nvPr/>
+        </p:nvSpPr>
+        <p:spPr>
+          <a:xfrm>
+            <a:off x="276335" y="1203504"/>
+            <a:ext cx="2322936" cy="1015663"/>
+          </a:xfrm>
+          <a:prstGeom prst="rect">
+            <a:avLst/>
+          </a:prstGeom>
+          <a:noFill/>
+        </p:spPr>
+        <p:txBody>
+          <a:bodyPr wrap="square" rtlCol="0">
+            <a:spAutoFit/>
+          </a:bodyPr>
+          <a:lstStyle/>
+          <a:p>
+            <a:pPr algn="r"/>
+            <a:r>
+              <a:rPr lang="en-US" sz="2000" i="1" dirty="0"/>
+              <a:t>Plan or set of dispositions subject of the catalog</a:t>
+            </a:r>
+            <a:endParaRPr lang="fr-FR" sz="2000" i="1" dirty="0"/>
+          </a:p>
+        </p:txBody>
+      </p:sp>
+      <p:sp>
+        <p:nvSpPr>
+          <p:cNvPr id="38" name="ZoneTexte 37">
+            <a:extLst>
+              <a:ext uri="{FF2B5EF4-FFF2-40B4-BE49-F238E27FC236}">
+                <a16:creationId xmlns:a16="http://schemas.microsoft.com/office/drawing/2014/main" id="{8E0F5F37-8C08-4088-AF66-625977D1EB29}"/>
+              </a:ext>
+            </a:extLst>
+          </p:cNvPr>
+          <p:cNvSpPr txBox="1"/>
+          <p:nvPr/>
+        </p:nvSpPr>
+        <p:spPr>
+          <a:xfrm>
+            <a:off x="3296293" y="2237038"/>
+            <a:ext cx="918004" cy="307777"/>
+          </a:xfrm>
+          <a:prstGeom prst="rect">
+            <a:avLst/>
+          </a:prstGeom>
+          <a:noFill/>
+        </p:spPr>
+        <p:txBody>
+          <a:bodyPr wrap="square" lIns="0" tIns="0" rIns="0" bIns="0" rtlCol="0">
+            <a:spAutoFit/>
+          </a:bodyPr>
+          <a:lstStyle>
+            <a:defPPr>
+              <a:defRPr lang="fr-FR"/>
+            </a:defPPr>
+            <a:lvl1pPr>
+              <a:defRPr sz="2000">
+                <a:solidFill>
+                  <a:srgbClr val="0070C0"/>
+                </a:solidFill>
+              </a:defRPr>
+            </a:lvl1pPr>
+          </a:lstStyle>
+          <a:p>
+            <a:r>
+              <a:rPr lang="en-US" noProof="1"/>
+              <a:t>subject</a:t>
+            </a:r>
+          </a:p>
+        </p:txBody>
+      </p:sp>
+      <p:sp>
+        <p:nvSpPr>
+          <p:cNvPr id="40" name="ZoneTexte 39">
+            <a:extLst>
+              <a:ext uri="{FF2B5EF4-FFF2-40B4-BE49-F238E27FC236}">
+                <a16:creationId xmlns:a16="http://schemas.microsoft.com/office/drawing/2014/main" id="{02E908B4-F40A-4226-B372-8D149E10F382}"/>
+              </a:ext>
+            </a:extLst>
+          </p:cNvPr>
+          <p:cNvSpPr txBox="1"/>
+          <p:nvPr/>
+        </p:nvSpPr>
+        <p:spPr>
+          <a:xfrm>
+            <a:off x="3325019" y="901832"/>
+            <a:ext cx="918004" cy="307777"/>
+          </a:xfrm>
+          <a:prstGeom prst="rect">
+            <a:avLst/>
+          </a:prstGeom>
+          <a:noFill/>
+        </p:spPr>
+        <p:txBody>
+          <a:bodyPr wrap="square" lIns="0" tIns="0" rIns="0" bIns="0" rtlCol="0">
+            <a:spAutoFit/>
+          </a:bodyPr>
+          <a:lstStyle>
+            <a:defPPr>
+              <a:defRPr lang="fr-FR"/>
+            </a:defPPr>
+            <a:lvl1pPr>
+              <a:defRPr sz="2000">
+                <a:solidFill>
+                  <a:srgbClr val="0070C0"/>
+                </a:solidFill>
+              </a:defRPr>
+            </a:lvl1pPr>
+          </a:lstStyle>
+          <a:p>
+            <a:r>
+              <a:rPr lang="en-US" noProof="1"/>
+              <a:t>subject</a:t>
             </a:r>
           </a:p>
         </p:txBody>

</xml_diff>